<commit_message>
some small updates to the presentation
</commit_message>
<xml_diff>
--- a/PalMod2022/docs/1_Introduction.pptx
+++ b/PalMod2022/docs/1_Introduction.pptx
@@ -14963,24 +14963,45 @@
           <a:lstStyle/>
           <a:p>
             <a:r>
-              <a:rPr lang="tr-TR" sz="2400" b="1"/>
-              <a:t>Dr. Miguel Andrés-Martínez </a:t>
-            </a:r>
-          </a:p>
-          <a:p>
-            <a:r>
-              <a:rPr lang="tr-TR" sz="2400"/>
-              <a:t>AWI, Climate Dynamics</a:t>
-            </a:r>
-          </a:p>
-          <a:p>
-            <a:r>
-              <a:rPr lang="tr-TR" sz="2400"/>
+              <a:rPr lang="tr-TR" sz="2400" b="1" dirty="0" err="1"/>
+              <a:t>Miguel</a:t>
+            </a:r>
+            <a:r>
+              <a:rPr lang="tr-TR" sz="2400" b="1" dirty="0"/>
+              <a:t> </a:t>
+            </a:r>
+            <a:r>
+              <a:rPr lang="tr-TR" sz="2400" b="1" dirty="0" err="1"/>
+              <a:t>Andrés-Martínez</a:t>
+            </a:r>
+            <a:r>
+              <a:rPr lang="tr-TR" sz="2400" b="1" dirty="0"/>
+              <a:t> </a:t>
+            </a:r>
+          </a:p>
+          <a:p>
+            <a:r>
+              <a:rPr lang="tr-TR" sz="2400" dirty="0"/>
+              <a:t>AWI, </a:t>
+            </a:r>
+            <a:r>
+              <a:rPr lang="tr-TR" sz="2400" dirty="0" err="1"/>
+              <a:t>Climate</a:t>
+            </a:r>
+            <a:r>
+              <a:rPr lang="tr-TR" sz="2400" dirty="0"/>
+              <a:t> Dynamics</a:t>
+            </a:r>
+          </a:p>
+          <a:p>
+            <a:r>
+              <a:rPr lang="tr-TR" sz="2400" dirty="0" err="1"/>
               <a:t>Bremerhaven</a:t>
             </a:r>
-          </a:p>
-          <a:p>
-            <a:endParaRPr lang="tr-TR"/>
+            <a:endParaRPr lang="tr-TR" sz="2400" dirty="0"/>
+          </a:p>
+          <a:p>
+            <a:endParaRPr lang="tr-TR" dirty="0"/>
           </a:p>
         </p:txBody>
       </p:sp>

</xml_diff>

<commit_message>
some mods to intro
</commit_message>
<xml_diff>
--- a/PalMod2022/docs/1_Introduction.pptx
+++ b/PalMod2022/docs/1_Introduction.pptx
@@ -535,8 +535,20 @@
           <a:lstStyle/>
           <a:p>
             <a:r>
-              <a:rPr lang="tr-TR"/>
-              <a:t>This is for Deniz</a:t>
+              <a:rPr lang="tr-TR" dirty="0" err="1"/>
+              <a:t>This</a:t>
+            </a:r>
+            <a:r>
+              <a:rPr lang="tr-TR" dirty="0"/>
+              <a:t> is </a:t>
+            </a:r>
+            <a:r>
+              <a:rPr lang="tr-TR" dirty="0" err="1"/>
+              <a:t>for</a:t>
+            </a:r>
+            <a:r>
+              <a:rPr lang="tr-TR" dirty="0"/>
+              <a:t> Deniz</a:t>
             </a:r>
           </a:p>
         </p:txBody>
@@ -28919,14 +28931,14 @@
           <p:nvPr>
             <p:extLst>
               <p:ext uri="{D42A27DB-BD31-4B8C-83A1-F6EECF244321}">
-                <p14:modId xmlns:p14="http://schemas.microsoft.com/office/powerpoint/2010/main" val="3795696782"/>
+                <p14:modId xmlns:p14="http://schemas.microsoft.com/office/powerpoint/2010/main" val="2989177765"/>
               </p:ext>
             </p:extLst>
           </p:nvPr>
         </p:nvGraphicFramePr>
         <p:xfrm>
           <a:off x="324052" y="2250529"/>
-          <a:ext cx="7530644" cy="3945496"/>
+          <a:ext cx="7530644" cy="3879045"/>
         </p:xfrm>
         <a:graphic>
           <a:graphicData uri="http://schemas.openxmlformats.org/drawingml/2006/table">
@@ -29811,29 +29823,6 @@
                         <a:t>Build and run FESOM</a:t>
                       </a:r>
                     </a:p>
-                    <a:p>
-                      <a:pPr marL="285750" indent="-285750" algn="just" rtl="0" fontAlgn="t">
-                        <a:spcBef>
-                          <a:spcPts val="0"/>
-                        </a:spcBef>
-                        <a:spcAft>
-                          <a:spcPts val="0"/>
-                        </a:spcAft>
-                        <a:buFont typeface="Arial" panose="020B0604020202020204" pitchFamily="34" charset="0"/>
-                        <a:buChar char="•"/>
-                      </a:pPr>
-                      <a:r>
-                        <a:rPr lang="en-US" sz="1400" b="0" i="0" u="none" strike="noStrike" dirty="0">
-                          <a:solidFill>
-                            <a:srgbClr val="000000"/>
-                          </a:solidFill>
-                          <a:effectLst/>
-                          <a:latin typeface="+mn-lt"/>
-                          <a:cs typeface="Arial" panose="020B0604020202020204" pitchFamily="34" charset="0"/>
-                        </a:rPr>
-                        <a:t>Build and run AWI-ESM-2.1</a:t>
-                      </a:r>
-                    </a:p>
                   </a:txBody>
                   <a:tcPr marL="63500" marR="63500" marT="63500" marB="63500">
                     <a:lnL w="12700" cap="flat" cmpd="sng" algn="ctr">
@@ -30537,20 +30526,9 @@
                           <a:latin typeface="+mn-lt"/>
                           <a:cs typeface="Arial" panose="020B0604020202020204" pitchFamily="34" charset="0"/>
                         </a:rPr>
-                        <a:t>Introduction to the workflow manager (</a:t>
+                        <a:t>Introduction to the workflow manager (offline coupling)</a:t>
                       </a:r>
-                      <a:r>
-                        <a:rPr lang="en-US" sz="1400" b="0" i="0" u="none" strike="noStrike">
-                          <a:solidFill>
-                            <a:srgbClr val="000000"/>
-                          </a:solidFill>
-                          <a:effectLst/>
-                          <a:latin typeface="+mn-lt"/>
-                          <a:cs typeface="Arial" panose="020B0604020202020204" pitchFamily="34" charset="0"/>
-                        </a:rPr>
-                        <a:t>offline coupling)</a:t>
-                      </a:r>
-                      <a:endParaRPr lang="tr-TR" sz="1400" b="0" i="0" u="none" strike="noStrike">
+                      <a:endParaRPr lang="tr-TR" sz="1400" b="0" i="0" u="none" strike="noStrike" dirty="0">
                         <a:solidFill>
                           <a:srgbClr val="000000"/>
                         </a:solidFill>
@@ -30569,17 +30547,6 @@
                         </a:spcAft>
                       </a:pPr>
                       <a:r>
-                        <a:rPr lang="en-US" sz="1400" b="0" i="0" u="none" strike="noStrike">
-                          <a:solidFill>
-                            <a:srgbClr val="000000"/>
-                          </a:solidFill>
-                          <a:effectLst/>
-                          <a:latin typeface="+mn-lt"/>
-                          <a:cs typeface="Arial" panose="020B0604020202020204" pitchFamily="34" charset="0"/>
-                        </a:rPr>
-                        <a:t>and machine </a:t>
-                      </a:r>
-                      <a:r>
                         <a:rPr lang="en-US" sz="1400" b="0" i="0" u="none" strike="noStrike" dirty="0">
                           <a:solidFill>
                             <a:srgbClr val="000000"/>
@@ -30588,7 +30555,7 @@
                           <a:latin typeface="+mn-lt"/>
                           <a:cs typeface="Arial" panose="020B0604020202020204" pitchFamily="34" charset="0"/>
                         </a:rPr>
-                        <a:t>environments</a:t>
+                        <a:t>and machine environments</a:t>
                       </a:r>
                       <a:endParaRPr lang="en-US" sz="2400" dirty="0">
                         <a:effectLst/>

</xml_diff>